<commit_message>
feat: add standout sql code + ppt
</commit_message>
<xml_diff>
--- a/Docs/HR Database Proposal.pptx
+++ b/Docs/HR Database Proposal.pptx
@@ -2996,8 +2996,8 @@
         </p:nvSpPr>
         <p:spPr>
           <a:xfrm>
-            <a:off x="2104459" y="685800"/>
-            <a:ext cx="2649600" cy="3429000"/>
+            <a:off x="2105025" y="685800"/>
+            <a:ext cx="2649538" cy="3429000"/>
           </a:xfrm>
           <a:custGeom>
             <a:avLst/>
@@ -36065,42 +36065,6 @@
             </a:endParaRPr>
           </a:p>
           <a:p>
-            <a:pPr marL="0" lvl="0" indent="0" algn="l" rtl="0">
-              <a:spcBef>
-                <a:spcPts val="1600"/>
-              </a:spcBef>
-              <a:spcAft>
-                <a:spcPts val="0"/>
-              </a:spcAft>
-              <a:buNone/>
-            </a:pPr>
-            <a:r>
-              <a:rPr lang="en" sz="1900" dirty="0">
-                <a:solidFill>
-                  <a:srgbClr val="FF0000"/>
-                </a:solidFill>
-              </a:rPr>
-              <a:t>** submit screenshot of stored procedure creation code, along with a screenshot of the stored procedure executed using Toni Lembeck as the parameter value</a:t>
-            </a:r>
-            <a:endParaRPr sz="1900" dirty="0">
-              <a:solidFill>
-                <a:srgbClr val="FF0000"/>
-              </a:solidFill>
-            </a:endParaRPr>
-          </a:p>
-          <a:p>
-            <a:pPr marL="457200" lvl="0" indent="0" algn="l" rtl="0">
-              <a:spcBef>
-                <a:spcPts val="1600"/>
-              </a:spcBef>
-              <a:spcAft>
-                <a:spcPts val="0"/>
-              </a:spcAft>
-              <a:buNone/>
-            </a:pPr>
-            <a:endParaRPr sz="1900" dirty="0"/>
-          </a:p>
-          <a:p>
             <a:pPr marL="457200" lvl="0" indent="0" algn="l" rtl="0">
               <a:spcBef>
                 <a:spcPts val="1600"/>
@@ -36114,6 +36078,96 @@
           </a:p>
         </p:txBody>
       </p:sp>
+      <p:pic>
+        <p:nvPicPr>
+          <p:cNvPr id="5" name="Picture 4">
+            <a:extLst>
+              <a:ext uri="{FF2B5EF4-FFF2-40B4-BE49-F238E27FC236}">
+                <a16:creationId xmlns:a16="http://schemas.microsoft.com/office/drawing/2014/main" id="{158151AA-DF8D-43F9-8D5E-76076D552792}"/>
+              </a:ext>
+            </a:extLst>
+          </p:cNvPr>
+          <p:cNvPicPr>
+            <a:picLocks noChangeAspect="1"/>
+          </p:cNvPicPr>
+          <p:nvPr/>
+        </p:nvPicPr>
+        <p:blipFill>
+          <a:blip r:embed="rId3"/>
+          <a:stretch>
+            <a:fillRect/>
+          </a:stretch>
+        </p:blipFill>
+        <p:spPr>
+          <a:xfrm>
+            <a:off x="264850" y="8692829"/>
+            <a:ext cx="6591300" cy="990600"/>
+          </a:xfrm>
+          <a:prstGeom prst="rect">
+            <a:avLst/>
+          </a:prstGeom>
+        </p:spPr>
+      </p:pic>
+      <p:pic>
+        <p:nvPicPr>
+          <p:cNvPr id="7" name="Picture 6">
+            <a:extLst>
+              <a:ext uri="{FF2B5EF4-FFF2-40B4-BE49-F238E27FC236}">
+                <a16:creationId xmlns:a16="http://schemas.microsoft.com/office/drawing/2014/main" id="{AB23290A-AD2C-4020-9B9C-5FAB3CDE60F2}"/>
+              </a:ext>
+            </a:extLst>
+          </p:cNvPr>
+          <p:cNvPicPr>
+            <a:picLocks noChangeAspect="1"/>
+          </p:cNvPicPr>
+          <p:nvPr/>
+        </p:nvPicPr>
+        <p:blipFill>
+          <a:blip r:embed="rId4"/>
+          <a:stretch>
+            <a:fillRect/>
+          </a:stretch>
+        </p:blipFill>
+        <p:spPr>
+          <a:xfrm>
+            <a:off x="264850" y="3868584"/>
+            <a:ext cx="2844434" cy="3534209"/>
+          </a:xfrm>
+          <a:prstGeom prst="rect">
+            <a:avLst/>
+          </a:prstGeom>
+        </p:spPr>
+      </p:pic>
+      <p:pic>
+        <p:nvPicPr>
+          <p:cNvPr id="9" name="Picture 8">
+            <a:extLst>
+              <a:ext uri="{FF2B5EF4-FFF2-40B4-BE49-F238E27FC236}">
+                <a16:creationId xmlns:a16="http://schemas.microsoft.com/office/drawing/2014/main" id="{22D90244-CB51-4DF3-BD6D-AFE84CFAD966}"/>
+              </a:ext>
+            </a:extLst>
+          </p:cNvPr>
+          <p:cNvPicPr>
+            <a:picLocks noChangeAspect="1"/>
+          </p:cNvPicPr>
+          <p:nvPr/>
+        </p:nvPicPr>
+        <p:blipFill>
+          <a:blip r:embed="rId5"/>
+          <a:stretch>
+            <a:fillRect/>
+          </a:stretch>
+        </p:blipFill>
+        <p:spPr>
+          <a:xfrm>
+            <a:off x="264850" y="7571561"/>
+            <a:ext cx="4676775" cy="952500"/>
+          </a:xfrm>
+          <a:prstGeom prst="rect">
+            <a:avLst/>
+          </a:prstGeom>
+        </p:spPr>
+      </p:pic>
     </p:spTree>
   </p:cSld>
   <p:clrMapOvr>

</xml_diff>